<commit_message>
available status on frontend
</commit_message>
<xml_diff>
--- a/Presentation.pptx
+++ b/Presentation.pptx
@@ -197,7 +197,7 @@
             <a:pPr rtl="0"/>
             <a:fld id="{F43FFF67-0A66-4BA5-8D01-D7436A93C5DC}" type="datetime1">
               <a:rPr lang="it-IT" smtClean="0"/>
-              <a:t>14/06/2024</a:t>
+              <a:t>16/06/2024</a:t>
             </a:fld>
             <a:endParaRPr lang="it-IT" dirty="0"/>
           </a:p>
@@ -416,7 +416,7 @@
             <a:fld id="{CCC7B77D-D2C2-452D-80DB-AB1E949B0C69}" type="datetime1">
               <a:rPr lang="it-IT" smtClean="0"/>
               <a:pPr/>
-              <a:t>14/06/2024</a:t>
+              <a:t>16/06/2024</a:t>
             </a:fld>
             <a:endParaRPr lang="it-IT" dirty="0"/>
           </a:p>
@@ -10784,10 +10784,15 @@
           </p:nvPr>
         </p:nvPicPr>
         <p:blipFill>
-          <a:blip r:embed="rId3"/>
-          <a:stretch>
-            <a:fillRect/>
-          </a:stretch>
+          <a:blip r:embed="rId3">
+            <a:extLst>
+              <a:ext uri="{28A0092B-C50C-407E-A947-70E740481C1C}">
+                <a14:useLocalDpi xmlns:a14="http://schemas.microsoft.com/office/drawing/2010/main" val="0"/>
+              </a:ext>
+            </a:extLst>
+          </a:blip>
+          <a:srcRect/>
+          <a:stretch/>
         </p:blipFill>
         <p:spPr>
           <a:xfrm>

</xml_diff>